<commit_message>
add reference full model
</commit_message>
<xml_diff>
--- a/archisurance-in-eas.pptx
+++ b/archisurance-in-eas.pptx
@@ -6091,13 +6091,8 @@
           <a:p>
             <a:r>
               <a:rPr lang="en-US" dirty="0"/>
-              <a:t>Use my earlier ArchiSurance model (by Archi) as </a:t>
-            </a:r>
-            <a:r>
-              <a:rPr lang="en-US"/>
-              <a:t>the reference</a:t>
-            </a:r>
-            <a:endParaRPr lang="en-US" dirty="0"/>
+              <a:t>Use my earlier ArchiSurance model (by Archi) as the reference</a:t>
+            </a:r>
           </a:p>
           <a:p>
             <a:r>
@@ -6172,54 +6167,19 @@
           <a:chExt cx="0" cy="0"/>
         </a:xfrm>
       </p:grpSpPr>
-      <p:sp>
-        <p:nvSpPr>
-          <p:cNvPr id="2" name="Title 1">
+      <p:pic>
+        <p:nvPicPr>
+          <p:cNvPr id="8" name="Picture 7" descr="Digital Connections">
             <a:extLst>
               <a:ext uri="{FF2B5EF4-FFF2-40B4-BE49-F238E27FC236}">
-                <a16:creationId xmlns:a16="http://schemas.microsoft.com/office/drawing/2014/main" id="{921633EB-7DCB-4DDC-80AF-C885A3EE1245}"/>
-              </a:ext>
-            </a:extLst>
-          </p:cNvPr>
-          <p:cNvSpPr>
-            <a:spLocks noGrp="1"/>
-          </p:cNvSpPr>
-          <p:nvPr>
-            <p:ph type="title"/>
-          </p:nvPr>
-        </p:nvSpPr>
-        <p:spPr>
-          <a:xfrm>
-            <a:off x="2290915" y="729658"/>
-            <a:ext cx="9319893" cy="988332"/>
-          </a:xfrm>
-        </p:spPr>
-        <p:txBody>
-          <a:bodyPr/>
-          <a:lstStyle/>
-          <a:p>
-            <a:r>
-              <a:rPr lang="en-US" dirty="0"/>
-              <a:t>Competitive Landscape</a:t>
-            </a:r>
-          </a:p>
-        </p:txBody>
-      </p:sp>
-      <p:pic>
-        <p:nvPicPr>
-          <p:cNvPr id="11" name="Content Placeholder 4" descr="Charts">
-            <a:extLst>
-              <a:ext uri="{FF2B5EF4-FFF2-40B4-BE49-F238E27FC236}">
-                <a16:creationId xmlns:a16="http://schemas.microsoft.com/office/drawing/2014/main" id="{47D9BE16-119C-43B2-9AE6-18C4A150C0EF}"/>
+                <a16:creationId xmlns:a16="http://schemas.microsoft.com/office/drawing/2014/main" id="{3BFDC680-79E6-ACAB-7B51-9884A2A41974}"/>
               </a:ext>
             </a:extLst>
           </p:cNvPr>
           <p:cNvPicPr>
-            <a:picLocks noGrp="1" noChangeAspect="1"/>
+            <a:picLocks noChangeAspect="1"/>
           </p:cNvPicPr>
-          <p:nvPr>
-            <p:ph sz="half" idx="1"/>
-          </p:nvPr>
+          <p:nvPr/>
         </p:nvPicPr>
         <p:blipFill rotWithShape="1">
           <a:blip r:embed="rId2" cstate="screen">
@@ -6229,47 +6189,52 @@
               </a:ext>
             </a:extLst>
           </a:blip>
+          <a:srcRect l="13265" t="9091" r="3502" b="-1"/>
           <a:stretch/>
         </p:blipFill>
         <p:spPr>
           <a:xfrm>
-            <a:off x="581025" y="2231480"/>
-            <a:ext cx="5422900" cy="3625353"/>
-          </a:xfrm>
-        </p:spPr>
-      </p:pic>
-      <p:pic>
-        <p:nvPicPr>
-          <p:cNvPr id="18" name="Content Placeholder 17" descr="Chart placeholder">
-            <a:extLst>
-              <a:ext uri="{FF2B5EF4-FFF2-40B4-BE49-F238E27FC236}">
-                <a16:creationId xmlns:a16="http://schemas.microsoft.com/office/drawing/2014/main" id="{BFEA8EC1-23A4-4843-A9C3-AE771D73392A}"/>
-              </a:ext>
-            </a:extLst>
-          </p:cNvPr>
-          <p:cNvPicPr>
-            <a:picLocks noGrp="1" noChangeAspect="1"/>
-          </p:cNvPicPr>
-          <p:nvPr>
-            <p:ph sz="half" idx="2"/>
-          </p:nvPr>
-        </p:nvPicPr>
-        <p:blipFill>
-          <a:blip r:embed="rId3"/>
-          <a:stretch>
-            <a:fillRect/>
-          </a:stretch>
-        </p:blipFill>
-        <p:spPr>
-          <a:xfrm>
-            <a:off x="6201811" y="2571845"/>
-            <a:ext cx="5395428" cy="2944623"/>
+            <a:off x="20" y="10"/>
+            <a:ext cx="12191980" cy="6857990"/>
           </a:xfrm>
           <a:prstGeom prst="rect">
             <a:avLst/>
           </a:prstGeom>
         </p:spPr>
       </p:pic>
+      <p:sp>
+        <p:nvSpPr>
+          <p:cNvPr id="2" name="Title 1">
+            <a:extLst>
+              <a:ext uri="{FF2B5EF4-FFF2-40B4-BE49-F238E27FC236}">
+                <a16:creationId xmlns:a16="http://schemas.microsoft.com/office/drawing/2014/main" id="{921633EB-7DCB-4DDC-80AF-C885A3EE1245}"/>
+              </a:ext>
+            </a:extLst>
+          </p:cNvPr>
+          <p:cNvSpPr>
+            <a:spLocks noGrp="1"/>
+          </p:cNvSpPr>
+          <p:nvPr>
+            <p:ph type="title"/>
+          </p:nvPr>
+        </p:nvSpPr>
+        <p:spPr>
+          <a:xfrm>
+            <a:off x="2290915" y="729658"/>
+            <a:ext cx="9319893" cy="988332"/>
+          </a:xfrm>
+        </p:spPr>
+        <p:txBody>
+          <a:bodyPr anchor="ctr"/>
+          <a:lstStyle/>
+          <a:p>
+            <a:r>
+              <a:rPr lang="en-US" b="1" dirty="0"/>
+              <a:t>Competitive Landscape</a:t>
+            </a:r>
+          </a:p>
+        </p:txBody>
+      </p:sp>
       <p:sp>
         <p:nvSpPr>
           <p:cNvPr id="3" name="TextBox 2">

</xml_diff>